<commit_message>
Changed slide in PPT
</commit_message>
<xml_diff>
--- a/Spotify Data Analysis1.pptx
+++ b/Spotify Data Analysis1.pptx
@@ -4812,11 +4812,7 @@
             <a:pPr lvl="1"/>
             <a:r>
               <a:rPr lang="en-US" sz="2000" dirty="0" smtClean="0"/>
-              <a:t>Song Trends</a:t>
-            </a:r>
-            <a:r>
-              <a:rPr lang="en-US" sz="2000" dirty="0" smtClean="0"/>
-              <a:t> </a:t>
+              <a:t>Song Trends </a:t>
             </a:r>
             <a:endParaRPr lang="en-US" sz="2000" dirty="0"/>
           </a:p>
@@ -5478,35 +5474,6 @@
       </p:sp>
       <p:pic>
         <p:nvPicPr>
-          <p:cNvPr id="7" name="Content Placeholder 6"/>
-          <p:cNvPicPr>
-            <a:picLocks noGrp="1" noChangeAspect="1"/>
-          </p:cNvPicPr>
-          <p:nvPr>
-            <p:ph idx="1"/>
-          </p:nvPr>
-        </p:nvPicPr>
-        <p:blipFill>
-          <a:blip r:embed="rId3">
-            <a:extLst>
-              <a:ext uri="{28A0092B-C50C-407E-A947-70E740481C1C}">
-                <a14:useLocalDpi xmlns:a14="http://schemas.microsoft.com/office/drawing/2010/main" val="0"/>
-              </a:ext>
-            </a:extLst>
-          </a:blip>
-          <a:stretch>
-            <a:fillRect/>
-          </a:stretch>
-        </p:blipFill>
-        <p:spPr>
-          <a:xfrm>
-            <a:off x="1037519" y="1843580"/>
-            <a:ext cx="10116962" cy="4315427"/>
-          </a:xfrm>
-        </p:spPr>
-      </p:pic>
-      <p:pic>
-        <p:nvPicPr>
           <p:cNvPr id="9" name="Picture 8" descr="A close up of a logo&#10;&#10;Description automatically generated">
             <a:extLst>
               <a:ext uri="{FF2B5EF4-FFF2-40B4-BE49-F238E27FC236}">
@@ -5520,7 +5487,7 @@
           <p:nvPr/>
         </p:nvPicPr>
         <p:blipFill>
-          <a:blip r:embed="rId4"/>
+          <a:blip r:embed="rId3"/>
           <a:stretch>
             <a:fillRect/>
           </a:stretch>
@@ -5533,6 +5500,35 @@
           <a:prstGeom prst="rect">
             <a:avLst/>
           </a:prstGeom>
+        </p:spPr>
+      </p:pic>
+      <p:pic>
+        <p:nvPicPr>
+          <p:cNvPr id="4" name="Content Placeholder 3"/>
+          <p:cNvPicPr>
+            <a:picLocks noGrp="1" noChangeAspect="1"/>
+          </p:cNvPicPr>
+          <p:nvPr>
+            <p:ph idx="1"/>
+          </p:nvPr>
+        </p:nvPicPr>
+        <p:blipFill>
+          <a:blip r:embed="rId4">
+            <a:extLst>
+              <a:ext uri="{28A0092B-C50C-407E-A947-70E740481C1C}">
+                <a14:useLocalDpi xmlns:a14="http://schemas.microsoft.com/office/drawing/2010/main" val="0"/>
+              </a:ext>
+            </a:extLst>
+          </a:blip>
+          <a:stretch>
+            <a:fillRect/>
+          </a:stretch>
+        </p:blipFill>
+        <p:spPr>
+          <a:xfrm>
+            <a:off x="838201" y="2053159"/>
+            <a:ext cx="10515600" cy="3896269"/>
+          </a:xfrm>
         </p:spPr>
       </p:pic>
     </p:spTree>
@@ -6979,19 +6975,7 @@
             <a:pPr lvl="1"/>
             <a:r>
               <a:rPr lang="en-US" dirty="0" smtClean="0"/>
-              <a:t>Narrow scale </a:t>
-            </a:r>
-            <a:r>
-              <a:rPr lang="en-US" dirty="0" smtClean="0"/>
-              <a:t>show </a:t>
-            </a:r>
-            <a:r>
-              <a:rPr lang="en-US" dirty="0" smtClean="0"/>
-              <a:t>clea</a:t>
-            </a:r>
-            <a:r>
-              <a:rPr lang="en-US" dirty="0" smtClean="0"/>
-              <a:t>r trends</a:t>
+              <a:t>Narrow scale show clear trends</a:t>
             </a:r>
           </a:p>
           <a:p>
@@ -7015,11 +6999,7 @@
           <a:p>
             <a:r>
               <a:rPr lang="en-US" dirty="0" smtClean="0"/>
-              <a:t>New Questions</a:t>
-            </a:r>
-            <a:r>
-              <a:rPr lang="en-US" dirty="0" smtClean="0"/>
-              <a:t> –</a:t>
+              <a:t>New Questions –</a:t>
             </a:r>
           </a:p>
           <a:p>
@@ -7035,7 +7015,6 @@
               <a:rPr lang="en-US" dirty="0" smtClean="0"/>
               <a:t>Predict future trends</a:t>
             </a:r>
-            <a:endParaRPr lang="en-US" dirty="0" smtClean="0"/>
           </a:p>
           <a:p>
             <a:pPr lvl="1"/>

</xml_diff>